<commit_message>
[Delivery] Presentation/Print version 1.2.0
</commit_message>
<xml_diff>
--- a/Presentations/2019-01-29 Thesis defense/06-Overview-Conclusion.pptx
+++ b/Presentations/2019-01-29 Thesis defense/06-Overview-Conclusion.pptx
@@ -331,7 +331,7 @@
               <a:pPr>
                 <a:defRPr/>
               </a:pPr>
-              <a:t>28-Feb-19</a:t>
+              <a:t>06-Mar-19</a:t>
             </a:fld>
             <a:endParaRPr lang="en-US" dirty="0"/>
           </a:p>
@@ -565,7 +565,7 @@
               <a:pPr>
                 <a:defRPr/>
               </a:pPr>
-              <a:t>28-Feb-19</a:t>
+              <a:t>06-Mar-19</a:t>
             </a:fld>
             <a:endParaRPr lang="en-US" dirty="0"/>
           </a:p>
@@ -4111,7 +4111,7 @@
           <a:graphicData uri="http://schemas.openxmlformats.org/presentationml/2006/ole">
             <mc:AlternateContent xmlns:mc="http://schemas.openxmlformats.org/markup-compatibility/2006">
               <mc:Choice xmlns:v="urn:schemas-microsoft-com:vml" Requires="v">
-                <p:oleObj spid="_x0000_s2401" name="think-cell Slide" r:id="rId4" imgW="270" imgH="270" progId="TCLayout.ActiveDocument.1">
+                <p:oleObj spid="_x0000_s2402" name="think-cell Slide" r:id="rId4" imgW="270" imgH="270" progId="TCLayout.ActiveDocument.1">
                   <p:embed/>
                 </p:oleObj>
               </mc:Choice>
@@ -4427,7 +4427,7 @@
           <a:graphicData uri="http://schemas.openxmlformats.org/presentationml/2006/ole">
             <mc:AlternateContent xmlns:mc="http://schemas.openxmlformats.org/markup-compatibility/2006">
               <mc:Choice xmlns:v="urn:schemas-microsoft-com:vml" Requires="v">
-                <p:oleObj spid="_x0000_s3425" name="think-cell Slide" r:id="rId4" imgW="270" imgH="270" progId="TCLayout.ActiveDocument.1">
+                <p:oleObj spid="_x0000_s3426" name="think-cell Slide" r:id="rId4" imgW="270" imgH="270" progId="TCLayout.ActiveDocument.1">
                   <p:embed/>
                 </p:oleObj>
               </mc:Choice>
@@ -6675,7 +6675,7 @@
           <a:graphicData uri="http://schemas.openxmlformats.org/presentationml/2006/ole">
             <mc:AlternateContent xmlns:mc="http://schemas.openxmlformats.org/markup-compatibility/2006">
               <mc:Choice xmlns:v="urn:schemas-microsoft-com:vml" Requires="v">
-                <p:oleObj spid="_x0000_s14653" name="think-cell Slide" r:id="rId5" imgW="270" imgH="270" progId="TCLayout.ActiveDocument.1">
+                <p:oleObj spid="_x0000_s14654" name="think-cell Slide" r:id="rId5" imgW="270" imgH="270" progId="TCLayout.ActiveDocument.1">
                   <p:embed/>
                 </p:oleObj>
               </mc:Choice>
@@ -6745,14 +6745,14 @@
           </a:ln>
           <a:extLst>
             <a:ext uri="{909E8E84-426E-40dd-AFC4-6F175D3DCCD1}">
-              <a14:hiddenFill xmlns="" xmlns:a14="http://schemas.microsoft.com/office/drawing/2010/main">
+              <a14:hiddenFill xmlns:a14="http://schemas.microsoft.com/office/drawing/2010/main" xmlns="">
                 <a:solidFill>
                   <a:srgbClr val="FFFFFF"/>
                 </a:solidFill>
               </a14:hiddenFill>
             </a:ext>
             <a:ext uri="{91240B29-F687-4f45-9708-019B960494DF}">
-              <a14:hiddenLine xmlns="" xmlns:a14="http://schemas.microsoft.com/office/drawing/2010/main" w="9525">
+              <a14:hiddenLine xmlns:a14="http://schemas.microsoft.com/office/drawing/2010/main" xmlns="" w="9525">
                 <a:solidFill>
                   <a:srgbClr val="000000"/>
                 </a:solidFill>
@@ -7479,7 +7479,7 @@
           <a:graphicData uri="http://schemas.openxmlformats.org/presentationml/2006/ole">
             <mc:AlternateContent xmlns:mc="http://schemas.openxmlformats.org/markup-compatibility/2006">
               <mc:Choice xmlns:v="urn:schemas-microsoft-com:vml" Requires="v">
-                <p:oleObj spid="_x0000_s1377" name="think-cell Slide" r:id="rId10" imgW="270" imgH="270" progId="TCLayout.ActiveDocument.1">
+                <p:oleObj spid="_x0000_s1378" name="think-cell Slide" r:id="rId10" imgW="270" imgH="270" progId="TCLayout.ActiveDocument.1">
                   <p:embed/>
                 </p:oleObj>
               </mc:Choice>
@@ -7568,14 +7568,14 @@
           </a:ln>
           <a:extLst>
             <a:ext uri="{909E8E84-426E-40dd-AFC4-6F175D3DCCD1}">
-              <a14:hiddenFill xmlns="" xmlns:a14="http://schemas.microsoft.com/office/drawing/2010/main">
+              <a14:hiddenFill xmlns:a14="http://schemas.microsoft.com/office/drawing/2010/main" xmlns="">
                 <a:solidFill>
                   <a:srgbClr val="FFFFFF"/>
                 </a:solidFill>
               </a14:hiddenFill>
             </a:ext>
             <a:ext uri="{91240B29-F687-4f45-9708-019B960494DF}">
-              <a14:hiddenLine xmlns="" xmlns:a14="http://schemas.microsoft.com/office/drawing/2010/main" w="9525">
+              <a14:hiddenLine xmlns:a14="http://schemas.microsoft.com/office/drawing/2010/main" xmlns="" w="9525">
                 <a:solidFill>
                   <a:srgbClr val="000000"/>
                 </a:solidFill>
@@ -9208,7 +9208,7 @@
               </a14:hiddenLine>
             </a:ext>
             <a:ext uri="{FAA26D3D-D897-4be2-8F04-BA451C77F1D7}">
-              <ma14:placeholderFlag xmlns="" xmlns:ma14="http://schemas.microsoft.com/office/mac/drawingml/2011/main" val="1"/>
+              <ma14:placeholderFlag xmlns:ma14="http://schemas.microsoft.com/office/mac/drawingml/2011/main" xmlns="" val="1"/>
             </a:ext>
           </a:extLst>
         </p:spPr>
@@ -10104,8 +10104,13 @@
           <a:p>
             <a:r>
               <a:rPr lang="en-US" dirty="0"/>
-              <a:t>How to get into fine restaurant</a:t>
-            </a:r>
+              <a:t>Explained </a:t>
+            </a:r>
+            <a:r>
+              <a:rPr lang="en-US"/>
+              <a:t>as story</a:t>
+            </a:r>
+            <a:endParaRPr lang="en-US" dirty="0"/>
           </a:p>
           <a:p>
             <a:r>
@@ -10257,10 +10262,9 @@
               <a:buNone/>
             </a:pPr>
             <a:r>
-              <a:rPr lang="en-US" i="1" u="sng" dirty="0" err="1"/>
-              <a:t>Colclusion</a:t>
-            </a:r>
-            <a:endParaRPr lang="en-US" i="1" u="sng" dirty="0"/>
+              <a:rPr lang="en-US" i="1" u="sng" dirty="0"/>
+              <a:t>Conclusion</a:t>
+            </a:r>
           </a:p>
         </p:txBody>
       </p:sp>
@@ -12410,6 +12414,15 @@
 </file>
 
 <file path=customXml/item1.xml><?xml version="1.0" encoding="utf-8"?>
+<p:properties xmlns:p="http://schemas.microsoft.com/office/2006/metadata/properties" xmlns:xsi="http://www.w3.org/2001/XMLSchema-instance">
+  <documentManagement/>
+</p:properties>
+</file>
+
+<file path=customXml/item2.xml>
+</file>
+
+<file path=customXml/item3.xml><?xml version="1.0" encoding="utf-8"?>
 <ct:contentTypeSchema xmlns:ct="http://schemas.microsoft.com/office/2006/metadata/contentType" xmlns:ma="http://schemas.microsoft.com/office/2006/metadata/properties/metaAttributes" ct:_="" ma:_="" ma:contentTypeName="Document" ma:contentTypeID="0x01010001EB125E098E7F49A0205A16AC239CE8" ma:contentTypeVersion="0" ma:contentTypeDescription="Create a new document." ma:contentTypeScope="" ma:versionID="73d8c0722a46478c40824ebff9961632">
   <xsd:schema xmlns:xsd="http://www.w3.org/2001/XMLSchema" xmlns:xs="http://www.w3.org/2001/XMLSchema" xmlns:p="http://schemas.microsoft.com/office/2006/metadata/properties" targetNamespace="http://schemas.microsoft.com/office/2006/metadata/properties" ma:root="true" ma:fieldsID="1b05d82d297216baf5b26c55225140df">
     <xsd:element name="properties">
@@ -12523,27 +12536,17 @@
 </ct:contentTypeSchema>
 </file>
 
-<file path=customXml/item2.xml>
-</file>
-
-<file path=customXml/item3.xml><?xml version="1.0" encoding="utf-8"?>
-<p:properties xmlns:p="http://schemas.microsoft.com/office/2006/metadata/properties" xmlns:xsi="http://www.w3.org/2001/XMLSchema-instance">
-  <documentManagement/>
-</p:properties>
-</file>
-
 <file path=customXml/itemProps1.xml><?xml version="1.0" encoding="utf-8"?>
-<ds:datastoreItem xmlns:ds="http://schemas.openxmlformats.org/officeDocument/2006/customXml" ds:itemID="{9A711268-4532-4FB9-8196-23D231793AA0}">
+<ds:datastoreItem xmlns:ds="http://schemas.openxmlformats.org/officeDocument/2006/customXml" ds:itemID="{D0C9905A-CBD0-4539-91F7-7758145DCB1F}">
   <ds:schemaRefs>
-    <ds:schemaRef ds:uri="http://schemas.microsoft.com/office/2006/metadata/contentType"/>
-    <ds:schemaRef ds:uri="http://schemas.microsoft.com/office/2006/metadata/properties/metaAttributes"/>
-    <ds:schemaRef ds:uri="http://www.w3.org/2001/XMLSchema"/>
     <ds:schemaRef ds:uri="http://schemas.microsoft.com/office/2006/metadata/properties"/>
+    <ds:schemaRef ds:uri="http://purl.org/dc/terms/"/>
     <ds:schemaRef ds:uri="http://schemas.openxmlformats.org/package/2006/metadata/core-properties"/>
+    <ds:schemaRef ds:uri="http://schemas.microsoft.com/office/2006/documentManagement/types"/>
+    <ds:schemaRef ds:uri="http://purl.org/dc/dcmitype/"/>
+    <ds:schemaRef ds:uri="http://schemas.microsoft.com/office/infopath/2007/PartnerControls"/>
     <ds:schemaRef ds:uri="http://purl.org/dc/elements/1.1/"/>
-    <ds:schemaRef ds:uri="http://purl.org/dc/terms/"/>
-    <ds:schemaRef ds:uri="http://schemas.microsoft.com/internal/obd"/>
-    <ds:schemaRef ds:uri="http://schemas.microsoft.com/office/infopath/2007/PartnerControls"/>
+    <ds:schemaRef ds:uri="http://www.w3.org/XML/1998/namespace"/>
   </ds:schemaRefs>
 </ds:datastoreItem>
 </file>
@@ -12558,16 +12561,17 @@
 </file>
 
 <file path=customXml/itemProps3.xml><?xml version="1.0" encoding="utf-8"?>
-<ds:datastoreItem xmlns:ds="http://schemas.openxmlformats.org/officeDocument/2006/customXml" ds:itemID="{D0C9905A-CBD0-4539-91F7-7758145DCB1F}">
+<ds:datastoreItem xmlns:ds="http://schemas.openxmlformats.org/officeDocument/2006/customXml" ds:itemID="{9A711268-4532-4FB9-8196-23D231793AA0}">
   <ds:schemaRefs>
+    <ds:schemaRef ds:uri="http://schemas.microsoft.com/office/2006/metadata/contentType"/>
+    <ds:schemaRef ds:uri="http://schemas.microsoft.com/office/2006/metadata/properties/metaAttributes"/>
+    <ds:schemaRef ds:uri="http://www.w3.org/2001/XMLSchema"/>
     <ds:schemaRef ds:uri="http://schemas.microsoft.com/office/2006/metadata/properties"/>
+    <ds:schemaRef ds:uri="http://schemas.openxmlformats.org/package/2006/metadata/core-properties"/>
+    <ds:schemaRef ds:uri="http://purl.org/dc/elements/1.1/"/>
     <ds:schemaRef ds:uri="http://purl.org/dc/terms/"/>
-    <ds:schemaRef ds:uri="http://schemas.openxmlformats.org/package/2006/metadata/core-properties"/>
-    <ds:schemaRef ds:uri="http://schemas.microsoft.com/office/2006/documentManagement/types"/>
-    <ds:schemaRef ds:uri="http://purl.org/dc/dcmitype/"/>
+    <ds:schemaRef ds:uri="http://schemas.microsoft.com/internal/obd"/>
     <ds:schemaRef ds:uri="http://schemas.microsoft.com/office/infopath/2007/PartnerControls"/>
-    <ds:schemaRef ds:uri="http://purl.org/dc/elements/1.1/"/>
-    <ds:schemaRef ds:uri="http://www.w3.org/XML/1998/namespace"/>
   </ds:schemaRefs>
 </ds:datastoreItem>
 </file>
</xml_diff>